<commit_message>
Updated powerpoint with system/software block diagrams
</commit_message>
<xml_diff>
--- a/project_01/docs/Tizora_ENGI301_project_01_proposal (4).pptx
+++ b/project_01/docs/Tizora_ENGI301_project_01_proposal (4).pptx
@@ -5,10 +5,10 @@
     <p:sldMasterId id="2147483648" r:id="rId1"/>
   </p:sldMasterIdLst>
   <p:notesMasterIdLst>
-    <p:notesMasterId r:id="rId9"/>
+    <p:notesMasterId r:id="rId12"/>
   </p:notesMasterIdLst>
   <p:handoutMasterIdLst>
-    <p:handoutMasterId r:id="rId10"/>
+    <p:handoutMasterId r:id="rId13"/>
   </p:handoutMasterIdLst>
   <p:sldIdLst>
     <p:sldId id="261" r:id="rId2"/>
@@ -17,7 +17,10 @@
     <p:sldId id="368" r:id="rId5"/>
     <p:sldId id="370" r:id="rId6"/>
     <p:sldId id="372" r:id="rId7"/>
-    <p:sldId id="369" r:id="rId8"/>
+    <p:sldId id="373" r:id="rId8"/>
+    <p:sldId id="374" r:id="rId9"/>
+    <p:sldId id="375" r:id="rId10"/>
+    <p:sldId id="369" r:id="rId11"/>
   </p:sldIdLst>
   <p:sldSz cx="12192000" cy="6858000"/>
   <p:notesSz cx="6858000" cy="9144000"/>
@@ -220,7 +223,7 @@
           <a:p>
             <a:fld id="{59041DB8-B66F-4DC8-A96E-33677E0F90FF}" type="datetimeFigureOut">
               <a:rPr lang="en-US" smtClean="0"/>
-              <a:t>10/1/2023</a:t>
+              <a:t>10/12/2023</a:t>
             </a:fld>
             <a:endParaRPr lang="en-US"/>
           </a:p>
@@ -385,7 +388,7 @@
           <a:p>
             <a:fld id="{DEB49C4A-65AC-492D-9701-81B46C3AD0E4}" type="datetimeFigureOut">
               <a:rPr lang="en-US" smtClean="0"/>
-              <a:t>10/1/2023</a:t>
+              <a:t>10/12/2023</a:t>
             </a:fld>
             <a:endParaRPr lang="en-US"/>
           </a:p>
@@ -2793,7 +2796,7 @@
           <a:p>
             <a:fld id="{384A29A4-78C8-47AB-BA06-22CB45938951}" type="datetime1">
               <a:rPr lang="en-US" smtClean="0"/>
-              <a:t>10/1/2023</a:t>
+              <a:t>10/12/2023</a:t>
             </a:fld>
             <a:endParaRPr lang="en-US"/>
           </a:p>
@@ -2988,7 +2991,7 @@
           <a:p>
             <a:fld id="{E1ED4ACF-2D82-46F2-A8E9-23963AA34E86}" type="datetime1">
               <a:rPr lang="en-US" smtClean="0"/>
-              <a:t>10/1/2023</a:t>
+              <a:t>10/12/2023</a:t>
             </a:fld>
             <a:endParaRPr lang="en-US"/>
           </a:p>
@@ -3182,7 +3185,7 @@
           <a:p>
             <a:fld id="{AE374B5B-21A0-4192-BF4C-38187F1A68D8}" type="datetime1">
               <a:rPr lang="en-US" smtClean="0"/>
-              <a:t>10/1/2023</a:t>
+              <a:t>10/12/2023</a:t>
             </a:fld>
             <a:endParaRPr lang="en-US"/>
           </a:p>
@@ -5523,7 +5526,7 @@
           <a:p>
             <a:fld id="{33B5CF7C-B333-48E1-A4A6-83A3C8B73AC0}" type="datetime1">
               <a:rPr lang="en-US" smtClean="0"/>
-              <a:t>10/1/2023</a:t>
+              <a:t>10/12/2023</a:t>
             </a:fld>
             <a:endParaRPr lang="en-US"/>
           </a:p>
@@ -5976,7 +5979,7 @@
           <a:p>
             <a:fld id="{AE320762-5CBF-4210-AB54-376B091119F8}" type="datetime1">
               <a:rPr lang="en-US" smtClean="0"/>
-              <a:t>10/1/2023</a:t>
+              <a:t>10/12/2023</a:t>
             </a:fld>
             <a:endParaRPr lang="en-US"/>
           </a:p>
@@ -6108,7 +6111,7 @@
           <a:p>
             <a:fld id="{7F0DB371-BF5F-4058-A212-1A908E4D2674}" type="datetime1">
               <a:rPr lang="en-US" smtClean="0"/>
-              <a:t>10/1/2023</a:t>
+              <a:t>10/12/2023</a:t>
             </a:fld>
             <a:endParaRPr lang="en-US"/>
           </a:p>
@@ -8041,7 +8044,7 @@
           <a:p>
             <a:fld id="{60A4083B-90AA-48CF-BAD5-00AA24D7F288}" type="datetime1">
               <a:rPr lang="en-US" smtClean="0"/>
-              <a:t>10/1/2023</a:t>
+              <a:t>10/12/2023</a:t>
             </a:fld>
             <a:endParaRPr lang="en-US"/>
           </a:p>
@@ -10300,7 +10303,7 @@
             <a:fld id="{F5BAF629-ECA2-4CF3-B790-9D9BDED98269}" type="datetime1">
               <a:rPr lang="en-US" smtClean="0"/>
               <a:pPr/>
-              <a:t>10/1/2023</a:t>
+              <a:t>10/12/2023</a:t>
             </a:fld>
             <a:endParaRPr lang="en-US"/>
           </a:p>
@@ -14595,7 +14598,7 @@
             <a:fld id="{B51B2453-8663-4C69-AF73-9FD7B1DEC5D0}" type="datetime1">
               <a:rPr lang="en-US" smtClean="0"/>
               <a:pPr/>
-              <a:t>10/1/2023</a:t>
+              <a:t>10/12/2023</a:t>
             </a:fld>
             <a:endParaRPr lang="en-US" dirty="0"/>
           </a:p>
@@ -15127,6 +15130,463 @@
     <p:extLst>
       <p:ext uri="{BB962C8B-B14F-4D97-AF65-F5344CB8AC3E}">
         <p14:creationId xmlns:p14="http://schemas.microsoft.com/office/powerpoint/2010/main" val="106904919"/>
+      </p:ext>
+    </p:extLst>
+  </p:cSld>
+  <p:clrMapOvr>
+    <a:masterClrMapping/>
+  </p:clrMapOvr>
+  <mc:AlternateContent xmlns:mc="http://schemas.openxmlformats.org/markup-compatibility/2006" xmlns:p14="http://schemas.microsoft.com/office/powerpoint/2010/main">
+    <mc:Choice Requires="p14">
+      <p:transition spd="med" p14:dur="700">
+        <p:fade/>
+      </p:transition>
+    </mc:Choice>
+    <mc:Fallback xmlns="">
+      <p:transition spd="med">
+        <p:fade/>
+      </p:transition>
+    </mc:Fallback>
+  </mc:AlternateContent>
+</p:sld>
+</file>
+
+<file path=ppt/slides/slide10.xml><?xml version="1.0" encoding="utf-8"?>
+<p:sld xmlns:a="http://schemas.openxmlformats.org/drawingml/2006/main" xmlns:r="http://schemas.openxmlformats.org/officeDocument/2006/relationships" xmlns:p="http://schemas.openxmlformats.org/presentationml/2006/main">
+  <p:cSld>
+    <p:spTree>
+      <p:nvGrpSpPr>
+        <p:cNvPr id="1" name=""/>
+        <p:cNvGrpSpPr/>
+        <p:nvPr/>
+      </p:nvGrpSpPr>
+      <p:grpSpPr>
+        <a:xfrm>
+          <a:off x="0" y="0"/>
+          <a:ext cx="0" cy="0"/>
+          <a:chOff x="0" y="0"/>
+          <a:chExt cx="0" cy="0"/>
+        </a:xfrm>
+      </p:grpSpPr>
+      <p:sp>
+        <p:nvSpPr>
+          <p:cNvPr id="2" name="Title 1">
+            <a:extLst>
+              <a:ext uri="{FF2B5EF4-FFF2-40B4-BE49-F238E27FC236}">
+                <a16:creationId xmlns:a16="http://schemas.microsoft.com/office/drawing/2014/main" id="{FA71467B-51C2-4E0B-B52A-83BD9F0EB83D}"/>
+              </a:ext>
+            </a:extLst>
+          </p:cNvPr>
+          <p:cNvSpPr>
+            <a:spLocks noGrp="1"/>
+          </p:cNvSpPr>
+          <p:nvPr>
+            <p:ph type="title"/>
+          </p:nvPr>
+        </p:nvSpPr>
+        <p:spPr/>
+        <p:txBody>
+          <a:bodyPr/>
+          <a:lstStyle/>
+          <a:p>
+            <a:r>
+              <a:rPr lang="en-US" dirty="0"/>
+              <a:t>Components / Budget</a:t>
+            </a:r>
+          </a:p>
+        </p:txBody>
+      </p:sp>
+      <p:graphicFrame>
+        <p:nvGraphicFramePr>
+          <p:cNvPr id="4" name="Content Placeholder 3">
+            <a:extLst>
+              <a:ext uri="{FF2B5EF4-FFF2-40B4-BE49-F238E27FC236}">
+                <a16:creationId xmlns:a16="http://schemas.microsoft.com/office/drawing/2014/main" id="{D0B47F4B-CB02-4D02-BE84-F6BC57D0FE26}"/>
+              </a:ext>
+            </a:extLst>
+          </p:cNvPr>
+          <p:cNvGraphicFramePr>
+            <a:graphicFrameLocks noGrp="1"/>
+          </p:cNvGraphicFramePr>
+          <p:nvPr>
+            <p:ph idx="1"/>
+            <p:extLst>
+              <p:ext uri="{D42A27DB-BD31-4B8C-83A1-F6EECF244321}">
+                <p14:modId xmlns:p14="http://schemas.microsoft.com/office/powerpoint/2010/main" val="3541771408"/>
+              </p:ext>
+            </p:extLst>
+          </p:nvPr>
+        </p:nvGraphicFramePr>
+        <p:xfrm>
+          <a:off x="1028700" y="1295400"/>
+          <a:ext cx="10553700" cy="4244340"/>
+        </p:xfrm>
+        <a:graphic>
+          <a:graphicData uri="http://schemas.openxmlformats.org/drawingml/2006/table">
+            <a:tbl>
+              <a:tblPr firstRow="1" bandRow="1">
+                <a:tableStyleId>{BC89EF96-8CEA-46FF-86C4-4CE0E7609802}</a:tableStyleId>
+              </a:tblPr>
+              <a:tblGrid>
+                <a:gridCol w="7418614">
+                  <a:extLst>
+                    <a:ext uri="{9D8B030D-6E8A-4147-A177-3AD203B41FA5}">
+                      <a16:colId xmlns:a16="http://schemas.microsoft.com/office/drawing/2014/main" val="3675253430"/>
+                    </a:ext>
+                  </a:extLst>
+                </a:gridCol>
+                <a:gridCol w="1567543">
+                  <a:extLst>
+                    <a:ext uri="{9D8B030D-6E8A-4147-A177-3AD203B41FA5}">
+                      <a16:colId xmlns:a16="http://schemas.microsoft.com/office/drawing/2014/main" val="1372058784"/>
+                    </a:ext>
+                  </a:extLst>
+                </a:gridCol>
+                <a:gridCol w="1567543">
+                  <a:extLst>
+                    <a:ext uri="{9D8B030D-6E8A-4147-A177-3AD203B41FA5}">
+                      <a16:colId xmlns:a16="http://schemas.microsoft.com/office/drawing/2014/main" val="356583018"/>
+                    </a:ext>
+                  </a:extLst>
+                </a:gridCol>
+              </a:tblGrid>
+              <a:tr h="495300">
+                <a:tc>
+                  <a:txBody>
+                    <a:bodyPr/>
+                    <a:lstStyle/>
+                    <a:p>
+                      <a:r>
+                        <a:rPr lang="en-US" dirty="0"/>
+                        <a:t>Component</a:t>
+                      </a:r>
+                    </a:p>
+                  </a:txBody>
+                  <a:tcPr/>
+                </a:tc>
+                <a:tc>
+                  <a:txBody>
+                    <a:bodyPr/>
+                    <a:lstStyle/>
+                    <a:p>
+                      <a:r>
+                        <a:rPr lang="en-US" dirty="0"/>
+                        <a:t>Need to Buy</a:t>
+                      </a:r>
+                    </a:p>
+                  </a:txBody>
+                  <a:tcPr/>
+                </a:tc>
+                <a:tc>
+                  <a:txBody>
+                    <a:bodyPr/>
+                    <a:lstStyle/>
+                    <a:p>
+                      <a:r>
+                        <a:rPr lang="en-US" dirty="0"/>
+                        <a:t>Cost</a:t>
+                      </a:r>
+                    </a:p>
+                  </a:txBody>
+                  <a:tcPr/>
+                </a:tc>
+                <a:extLst>
+                  <a:ext uri="{0D108BD9-81ED-4DB2-BD59-A6C34878D82A}">
+                    <a16:rowId xmlns:a16="http://schemas.microsoft.com/office/drawing/2014/main" val="1606800787"/>
+                  </a:ext>
+                </a:extLst>
+              </a:tr>
+              <a:tr h="619760">
+                <a:tc>
+                  <a:txBody>
+                    <a:bodyPr/>
+                    <a:lstStyle/>
+                    <a:p>
+                      <a:r>
+                        <a:rPr lang="en-US" dirty="0"/>
+                        <a:t>Stepper Motor</a:t>
+                      </a:r>
+                      <a:br>
+                        <a:rPr lang="en-US" dirty="0"/>
+                      </a:br>
+                      <a:r>
+                        <a:rPr lang="en-US" dirty="0">
+                          <a:hlinkClick r:id="rId2"/>
+                        </a:rPr>
+                        <a:t>https://www.amazon.com/dp/B0B38H2ZMR</a:t>
+                      </a:r>
+                      <a:endParaRPr lang="en-US" dirty="0"/>
+                    </a:p>
+                  </a:txBody>
+                  <a:tcPr/>
+                </a:tc>
+                <a:tc>
+                  <a:txBody>
+                    <a:bodyPr/>
+                    <a:lstStyle/>
+                    <a:p>
+                      <a:r>
+                        <a:rPr lang="en-US" dirty="0"/>
+                        <a:t>3</a:t>
+                      </a:r>
+                    </a:p>
+                  </a:txBody>
+                  <a:tcPr/>
+                </a:tc>
+                <a:tc>
+                  <a:txBody>
+                    <a:bodyPr/>
+                    <a:lstStyle/>
+                    <a:p>
+                      <a:r>
+                        <a:rPr lang="en-US" dirty="0"/>
+                        <a:t>20</a:t>
+                      </a:r>
+                    </a:p>
+                  </a:txBody>
+                  <a:tcPr/>
+                </a:tc>
+                <a:extLst>
+                  <a:ext uri="{0D108BD9-81ED-4DB2-BD59-A6C34878D82A}">
+                    <a16:rowId xmlns:a16="http://schemas.microsoft.com/office/drawing/2014/main" val="33313506"/>
+                  </a:ext>
+                </a:extLst>
+              </a:tr>
+              <a:tr h="533400">
+                <a:tc>
+                  <a:txBody>
+                    <a:bodyPr/>
+                    <a:lstStyle/>
+                    <a:p>
+                      <a:r>
+                        <a:rPr lang="en-US" dirty="0"/>
+                        <a:t>Stepper Motor Driver</a:t>
+                      </a:r>
+                      <a:br>
+                        <a:rPr lang="en-US" dirty="0"/>
+                      </a:br>
+                      <a:r>
+                        <a:rPr lang="en-US" dirty="0">
+                          <a:hlinkClick r:id="rId3"/>
+                        </a:rPr>
+                        <a:t>https://www.amazon.com/HiLetgo-Stepstick-Stepper-Printer-Compatible/dp/B07BND65C8</a:t>
+                      </a:r>
+                      <a:endParaRPr lang="en-US" dirty="0"/>
+                    </a:p>
+                  </a:txBody>
+                  <a:tcPr/>
+                </a:tc>
+                <a:tc>
+                  <a:txBody>
+                    <a:bodyPr/>
+                    <a:lstStyle/>
+                    <a:p>
+                      <a:r>
+                        <a:rPr lang="en-US" dirty="0"/>
+                        <a:t>3</a:t>
+                      </a:r>
+                    </a:p>
+                  </a:txBody>
+                  <a:tcPr/>
+                </a:tc>
+                <a:tc>
+                  <a:txBody>
+                    <a:bodyPr/>
+                    <a:lstStyle/>
+                    <a:p>
+                      <a:r>
+                        <a:rPr lang="en-US" dirty="0"/>
+                        <a:t>5</a:t>
+                      </a:r>
+                    </a:p>
+                  </a:txBody>
+                  <a:tcPr/>
+                </a:tc>
+                <a:extLst>
+                  <a:ext uri="{0D108BD9-81ED-4DB2-BD59-A6C34878D82A}">
+                    <a16:rowId xmlns:a16="http://schemas.microsoft.com/office/drawing/2014/main" val="2595126612"/>
+                  </a:ext>
+                </a:extLst>
+              </a:tr>
+              <a:tr h="609600">
+                <a:tc>
+                  <a:txBody>
+                    <a:bodyPr/>
+                    <a:lstStyle/>
+                    <a:p>
+                      <a:r>
+                        <a:rPr lang="en-US" dirty="0"/>
+                        <a:t>Level Shifter</a:t>
+                      </a:r>
+                    </a:p>
+                    <a:p>
+                      <a:r>
+                        <a:rPr lang="en-US" dirty="0">
+                          <a:hlinkClick r:id="rId4"/>
+                        </a:rPr>
+                        <a:t>https://www.amazon.com/EPLZON-Converter-Bi-Directional-Compatible-Raspberry/dp/B09R1QG957</a:t>
+                      </a:r>
+                      <a:endParaRPr lang="en-US" dirty="0"/>
+                    </a:p>
+                  </a:txBody>
+                  <a:tcPr/>
+                </a:tc>
+                <a:tc>
+                  <a:txBody>
+                    <a:bodyPr/>
+                    <a:lstStyle/>
+                    <a:p>
+                      <a:r>
+                        <a:rPr lang="en-US" dirty="0"/>
+                        <a:t>3</a:t>
+                      </a:r>
+                    </a:p>
+                  </a:txBody>
+                  <a:tcPr/>
+                </a:tc>
+                <a:tc>
+                  <a:txBody>
+                    <a:bodyPr/>
+                    <a:lstStyle/>
+                    <a:p>
+                      <a:r>
+                        <a:rPr lang="en-US" dirty="0"/>
+                        <a:t>5</a:t>
+                      </a:r>
+                    </a:p>
+                  </a:txBody>
+                  <a:tcPr/>
+                </a:tc>
+                <a:extLst>
+                  <a:ext uri="{0D108BD9-81ED-4DB2-BD59-A6C34878D82A}">
+                    <a16:rowId xmlns:a16="http://schemas.microsoft.com/office/drawing/2014/main" val="1757493575"/>
+                  </a:ext>
+                </a:extLst>
+              </a:tr>
+              <a:tr h="0">
+                <a:tc>
+                  <a:txBody>
+                    <a:bodyPr/>
+                    <a:lstStyle/>
+                    <a:p>
+                      <a:r>
+                        <a:rPr lang="en-US" dirty="0"/>
+                        <a:t>SPI Screen</a:t>
+                      </a:r>
+                      <a:br>
+                        <a:rPr lang="en-US" dirty="0"/>
+                      </a:br>
+                      <a:r>
+                        <a:rPr lang="en-US" dirty="0">
+                          <a:hlinkClick r:id="rId5"/>
+                        </a:rPr>
+                        <a:t>https://www.adafruit.com/product/1770</a:t>
+                      </a:r>
+                      <a:endParaRPr lang="en-US" dirty="0"/>
+                    </a:p>
+                  </a:txBody>
+                  <a:tcPr/>
+                </a:tc>
+                <a:tc>
+                  <a:txBody>
+                    <a:bodyPr/>
+                    <a:lstStyle/>
+                    <a:p>
+                      <a:r>
+                        <a:rPr lang="en-US" dirty="0"/>
+                        <a:t>1</a:t>
+                      </a:r>
+                    </a:p>
+                    <a:p>
+                      <a:endParaRPr lang="en-US" dirty="0"/>
+                    </a:p>
+                  </a:txBody>
+                  <a:tcPr/>
+                </a:tc>
+                <a:tc>
+                  <a:txBody>
+                    <a:bodyPr/>
+                    <a:lstStyle/>
+                    <a:p>
+                      <a:r>
+                        <a:rPr lang="en-US" dirty="0"/>
+                        <a:t>30</a:t>
+                      </a:r>
+                    </a:p>
+                  </a:txBody>
+                  <a:tcPr/>
+                </a:tc>
+                <a:extLst>
+                  <a:ext uri="{0D108BD9-81ED-4DB2-BD59-A6C34878D82A}">
+                    <a16:rowId xmlns:a16="http://schemas.microsoft.com/office/drawing/2014/main" val="3862840897"/>
+                  </a:ext>
+                </a:extLst>
+              </a:tr>
+              <a:tr h="474980">
+                <a:tc>
+                  <a:txBody>
+                    <a:bodyPr/>
+                    <a:lstStyle/>
+                    <a:p>
+                      <a:r>
+                        <a:rPr lang="en-US" dirty="0"/>
+                        <a:t>Acrylic</a:t>
+                      </a:r>
+                      <a:br>
+                        <a:rPr lang="en-US" dirty="0"/>
+                      </a:br>
+                      <a:r>
+                        <a:rPr lang="en-US" dirty="0">
+                          <a:hlinkClick r:id="rId6"/>
+                        </a:rPr>
+                        <a:t>https://oedk.wildapricot.org/order</a:t>
+                      </a:r>
+                      <a:endParaRPr lang="en-US" dirty="0"/>
+                    </a:p>
+                  </a:txBody>
+                  <a:tcPr/>
+                </a:tc>
+                <a:tc>
+                  <a:txBody>
+                    <a:bodyPr/>
+                    <a:lstStyle/>
+                    <a:p>
+                      <a:r>
+                        <a:rPr lang="en-US" dirty="0"/>
+                        <a:t>2</a:t>
+                      </a:r>
+                    </a:p>
+                  </a:txBody>
+                  <a:tcPr/>
+                </a:tc>
+                <a:tc>
+                  <a:txBody>
+                    <a:bodyPr/>
+                    <a:lstStyle/>
+                    <a:p>
+                      <a:r>
+                        <a:rPr lang="en-US"/>
+                        <a:t>14</a:t>
+                      </a:r>
+                      <a:endParaRPr lang="en-US" dirty="0"/>
+                    </a:p>
+                  </a:txBody>
+                  <a:tcPr/>
+                </a:tc>
+                <a:extLst>
+                  <a:ext uri="{0D108BD9-81ED-4DB2-BD59-A6C34878D82A}">
+                    <a16:rowId xmlns:a16="http://schemas.microsoft.com/office/drawing/2014/main" val="1364489299"/>
+                  </a:ext>
+                </a:extLst>
+              </a:tr>
+            </a:tbl>
+          </a:graphicData>
+        </a:graphic>
+      </p:graphicFrame>
+    </p:spTree>
+    <p:extLst>
+      <p:ext uri="{BB962C8B-B14F-4D97-AF65-F5344CB8AC3E}">
+        <p14:creationId xmlns:p14="http://schemas.microsoft.com/office/powerpoint/2010/main" val="1131248096"/>
       </p:ext>
     </p:extLst>
   </p:cSld>
@@ -17602,7 +18062,7 @@
           <a:p>
             <a:r>
               <a:rPr lang="en-US" dirty="0"/>
-              <a:t>User Interface Flowchart</a:t>
+              <a:t>Overall System Block Diagram</a:t>
             </a:r>
           </a:p>
         </p:txBody>
@@ -17682,7 +18142,7 @@
           <p:cNvPr id="2" name="Title 1">
             <a:extLst>
               <a:ext uri="{FF2B5EF4-FFF2-40B4-BE49-F238E27FC236}">
-                <a16:creationId xmlns:a16="http://schemas.microsoft.com/office/drawing/2014/main" id="{FA71467B-51C2-4E0B-B52A-83BD9F0EB83D}"/>
+                <a16:creationId xmlns:a16="http://schemas.microsoft.com/office/drawing/2014/main" id="{897D86D6-35BD-40B1-6F55-3EB20816F5F6}"/>
               </a:ext>
             </a:extLst>
           </p:cNvPr>
@@ -17693,422 +18153,466 @@
             <p:ph type="title"/>
           </p:nvPr>
         </p:nvSpPr>
-        <p:spPr/>
+        <p:spPr>
+          <a:xfrm>
+            <a:off x="7315200" y="-800100"/>
+            <a:ext cx="3657600" cy="2194560"/>
+          </a:xfrm>
+        </p:spPr>
+        <p:txBody>
+          <a:bodyPr anchor="b">
+            <a:normAutofit/>
+          </a:bodyPr>
+          <a:lstStyle/>
+          <a:p>
+            <a:r>
+              <a:rPr lang="en-US" dirty="0"/>
+              <a:t>Timer Block Diagram</a:t>
+            </a:r>
+          </a:p>
+        </p:txBody>
+      </p:sp>
+      <p:sp>
+        <p:nvSpPr>
+          <p:cNvPr id="4" name="Picture Placeholder 3">
+            <a:extLst>
+              <a:ext uri="{FF2B5EF4-FFF2-40B4-BE49-F238E27FC236}">
+                <a16:creationId xmlns:a16="http://schemas.microsoft.com/office/drawing/2014/main" id="{83A10B1E-06F8-EBC8-49C4-DE7828F1191D}"/>
+              </a:ext>
+            </a:extLst>
+          </p:cNvPr>
+          <p:cNvSpPr>
+            <a:spLocks noGrp="1"/>
+          </p:cNvSpPr>
+          <p:nvPr>
+            <p:ph type="pic" idx="1"/>
+          </p:nvPr>
+        </p:nvSpPr>
+        <p:spPr>
+          <a:xfrm>
+            <a:off x="4412" y="-1314"/>
+            <a:ext cx="7315200" cy="6858000"/>
+          </a:xfrm>
+        </p:spPr>
         <p:txBody>
           <a:bodyPr/>
           <a:lstStyle/>
           <a:p>
-            <a:r>
-              <a:rPr lang="en-US" dirty="0"/>
-              <a:t>Components / Budget</a:t>
-            </a:r>
+            <a:endParaRPr lang="en-US" dirty="0"/>
           </a:p>
         </p:txBody>
       </p:sp>
-      <p:graphicFrame>
-        <p:nvGraphicFramePr>
-          <p:cNvPr id="4" name="Content Placeholder 3">
+      <p:pic>
+        <p:nvPicPr>
+          <p:cNvPr id="7" name="Picture 6">
             <a:extLst>
               <a:ext uri="{FF2B5EF4-FFF2-40B4-BE49-F238E27FC236}">
-                <a16:creationId xmlns:a16="http://schemas.microsoft.com/office/drawing/2014/main" id="{D0B47F4B-CB02-4D02-BE84-F6BC57D0FE26}"/>
+                <a16:creationId xmlns:a16="http://schemas.microsoft.com/office/drawing/2014/main" id="{CDCDDB74-E909-E37B-CC7A-6D23C2E8029A}"/>
               </a:ext>
             </a:extLst>
           </p:cNvPr>
-          <p:cNvGraphicFramePr>
-            <a:graphicFrameLocks noGrp="1"/>
-          </p:cNvGraphicFramePr>
-          <p:nvPr>
-            <p:ph idx="1"/>
-            <p:extLst>
-              <p:ext uri="{D42A27DB-BD31-4B8C-83A1-F6EECF244321}">
-                <p14:modId xmlns:p14="http://schemas.microsoft.com/office/powerpoint/2010/main" val="3541771408"/>
-              </p:ext>
-            </p:extLst>
-          </p:nvPr>
-        </p:nvGraphicFramePr>
-        <p:xfrm>
-          <a:off x="1028700" y="1295400"/>
-          <a:ext cx="10553700" cy="4244340"/>
-        </p:xfrm>
-        <a:graphic>
-          <a:graphicData uri="http://schemas.openxmlformats.org/drawingml/2006/table">
-            <a:tbl>
-              <a:tblPr firstRow="1" bandRow="1">
-                <a:tableStyleId>{BC89EF96-8CEA-46FF-86C4-4CE0E7609802}</a:tableStyleId>
-              </a:tblPr>
-              <a:tblGrid>
-                <a:gridCol w="7418614">
-                  <a:extLst>
-                    <a:ext uri="{9D8B030D-6E8A-4147-A177-3AD203B41FA5}">
-                      <a16:colId xmlns:a16="http://schemas.microsoft.com/office/drawing/2014/main" val="3675253430"/>
-                    </a:ext>
-                  </a:extLst>
-                </a:gridCol>
-                <a:gridCol w="1567543">
-                  <a:extLst>
-                    <a:ext uri="{9D8B030D-6E8A-4147-A177-3AD203B41FA5}">
-                      <a16:colId xmlns:a16="http://schemas.microsoft.com/office/drawing/2014/main" val="1372058784"/>
-                    </a:ext>
-                  </a:extLst>
-                </a:gridCol>
-                <a:gridCol w="1567543">
-                  <a:extLst>
-                    <a:ext uri="{9D8B030D-6E8A-4147-A177-3AD203B41FA5}">
-                      <a16:colId xmlns:a16="http://schemas.microsoft.com/office/drawing/2014/main" val="356583018"/>
-                    </a:ext>
-                  </a:extLst>
-                </a:gridCol>
-              </a:tblGrid>
-              <a:tr h="495300">
-                <a:tc>
-                  <a:txBody>
-                    <a:bodyPr/>
-                    <a:lstStyle/>
-                    <a:p>
-                      <a:r>
-                        <a:rPr lang="en-US" dirty="0"/>
-                        <a:t>Component</a:t>
-                      </a:r>
-                    </a:p>
-                  </a:txBody>
-                  <a:tcPr/>
-                </a:tc>
-                <a:tc>
-                  <a:txBody>
-                    <a:bodyPr/>
-                    <a:lstStyle/>
-                    <a:p>
-                      <a:r>
-                        <a:rPr lang="en-US" dirty="0"/>
-                        <a:t>Need to Buy</a:t>
-                      </a:r>
-                    </a:p>
-                  </a:txBody>
-                  <a:tcPr/>
-                </a:tc>
-                <a:tc>
-                  <a:txBody>
-                    <a:bodyPr/>
-                    <a:lstStyle/>
-                    <a:p>
-                      <a:r>
-                        <a:rPr lang="en-US" dirty="0"/>
-                        <a:t>Cost</a:t>
-                      </a:r>
-                    </a:p>
-                  </a:txBody>
-                  <a:tcPr/>
-                </a:tc>
-                <a:extLst>
-                  <a:ext uri="{0D108BD9-81ED-4DB2-BD59-A6C34878D82A}">
-                    <a16:rowId xmlns:a16="http://schemas.microsoft.com/office/drawing/2014/main" val="1606800787"/>
-                  </a:ext>
-                </a:extLst>
-              </a:tr>
-              <a:tr h="619760">
-                <a:tc>
-                  <a:txBody>
-                    <a:bodyPr/>
-                    <a:lstStyle/>
-                    <a:p>
-                      <a:r>
-                        <a:rPr lang="en-US" dirty="0"/>
-                        <a:t>Stepper Motor</a:t>
-                      </a:r>
-                      <a:br>
-                        <a:rPr lang="en-US" dirty="0"/>
-                      </a:br>
-                      <a:r>
-                        <a:rPr lang="en-US" dirty="0">
-                          <a:hlinkClick r:id="rId2"/>
-                        </a:rPr>
-                        <a:t>https://www.amazon.com/dp/B0B38H2ZMR</a:t>
-                      </a:r>
-                      <a:endParaRPr lang="en-US" dirty="0"/>
-                    </a:p>
-                  </a:txBody>
-                  <a:tcPr/>
-                </a:tc>
-                <a:tc>
-                  <a:txBody>
-                    <a:bodyPr/>
-                    <a:lstStyle/>
-                    <a:p>
-                      <a:r>
-                        <a:rPr lang="en-US" dirty="0"/>
-                        <a:t>3</a:t>
-                      </a:r>
-                    </a:p>
-                  </a:txBody>
-                  <a:tcPr/>
-                </a:tc>
-                <a:tc>
-                  <a:txBody>
-                    <a:bodyPr/>
-                    <a:lstStyle/>
-                    <a:p>
-                      <a:r>
-                        <a:rPr lang="en-US" dirty="0"/>
-                        <a:t>20</a:t>
-                      </a:r>
-                    </a:p>
-                  </a:txBody>
-                  <a:tcPr/>
-                </a:tc>
-                <a:extLst>
-                  <a:ext uri="{0D108BD9-81ED-4DB2-BD59-A6C34878D82A}">
-                    <a16:rowId xmlns:a16="http://schemas.microsoft.com/office/drawing/2014/main" val="33313506"/>
-                  </a:ext>
-                </a:extLst>
-              </a:tr>
-              <a:tr h="533400">
-                <a:tc>
-                  <a:txBody>
-                    <a:bodyPr/>
-                    <a:lstStyle/>
-                    <a:p>
-                      <a:r>
-                        <a:rPr lang="en-US" dirty="0"/>
-                        <a:t>Stepper Motor Driver</a:t>
-                      </a:r>
-                      <a:br>
-                        <a:rPr lang="en-US" dirty="0"/>
-                      </a:br>
-                      <a:r>
-                        <a:rPr lang="en-US" dirty="0">
-                          <a:hlinkClick r:id="rId3"/>
-                        </a:rPr>
-                        <a:t>https://www.amazon.com/HiLetgo-Stepstick-Stepper-Printer-Compatible/dp/B07BND65C8</a:t>
-                      </a:r>
-                      <a:endParaRPr lang="en-US" dirty="0"/>
-                    </a:p>
-                  </a:txBody>
-                  <a:tcPr/>
-                </a:tc>
-                <a:tc>
-                  <a:txBody>
-                    <a:bodyPr/>
-                    <a:lstStyle/>
-                    <a:p>
-                      <a:r>
-                        <a:rPr lang="en-US" dirty="0"/>
-                        <a:t>3</a:t>
-                      </a:r>
-                    </a:p>
-                  </a:txBody>
-                  <a:tcPr/>
-                </a:tc>
-                <a:tc>
-                  <a:txBody>
-                    <a:bodyPr/>
-                    <a:lstStyle/>
-                    <a:p>
-                      <a:r>
-                        <a:rPr lang="en-US" dirty="0"/>
-                        <a:t>5</a:t>
-                      </a:r>
-                    </a:p>
-                  </a:txBody>
-                  <a:tcPr/>
-                </a:tc>
-                <a:extLst>
-                  <a:ext uri="{0D108BD9-81ED-4DB2-BD59-A6C34878D82A}">
-                    <a16:rowId xmlns:a16="http://schemas.microsoft.com/office/drawing/2014/main" val="2595126612"/>
-                  </a:ext>
-                </a:extLst>
-              </a:tr>
-              <a:tr h="609600">
-                <a:tc>
-                  <a:txBody>
-                    <a:bodyPr/>
-                    <a:lstStyle/>
-                    <a:p>
-                      <a:r>
-                        <a:rPr lang="en-US" dirty="0"/>
-                        <a:t>Level Shifter</a:t>
-                      </a:r>
-                    </a:p>
-                    <a:p>
-                      <a:r>
-                        <a:rPr lang="en-US" dirty="0">
-                          <a:hlinkClick r:id="rId4"/>
-                        </a:rPr>
-                        <a:t>https://www.amazon.com/EPLZON-Converter-Bi-Directional-Compatible-Raspberry/dp/B09R1QG957</a:t>
-                      </a:r>
-                      <a:endParaRPr lang="en-US" dirty="0"/>
-                    </a:p>
-                  </a:txBody>
-                  <a:tcPr/>
-                </a:tc>
-                <a:tc>
-                  <a:txBody>
-                    <a:bodyPr/>
-                    <a:lstStyle/>
-                    <a:p>
-                      <a:r>
-                        <a:rPr lang="en-US" dirty="0"/>
-                        <a:t>3</a:t>
-                      </a:r>
-                    </a:p>
-                  </a:txBody>
-                  <a:tcPr/>
-                </a:tc>
-                <a:tc>
-                  <a:txBody>
-                    <a:bodyPr/>
-                    <a:lstStyle/>
-                    <a:p>
-                      <a:r>
-                        <a:rPr lang="en-US" dirty="0"/>
-                        <a:t>5</a:t>
-                      </a:r>
-                    </a:p>
-                  </a:txBody>
-                  <a:tcPr/>
-                </a:tc>
-                <a:extLst>
-                  <a:ext uri="{0D108BD9-81ED-4DB2-BD59-A6C34878D82A}">
-                    <a16:rowId xmlns:a16="http://schemas.microsoft.com/office/drawing/2014/main" val="1757493575"/>
-                  </a:ext>
-                </a:extLst>
-              </a:tr>
-              <a:tr h="0">
-                <a:tc>
-                  <a:txBody>
-                    <a:bodyPr/>
-                    <a:lstStyle/>
-                    <a:p>
-                      <a:r>
-                        <a:rPr lang="en-US" dirty="0"/>
-                        <a:t>SPI Screen</a:t>
-                      </a:r>
-                      <a:br>
-                        <a:rPr lang="en-US" dirty="0"/>
-                      </a:br>
-                      <a:r>
-                        <a:rPr lang="en-US" dirty="0">
-                          <a:hlinkClick r:id="rId5"/>
-                        </a:rPr>
-                        <a:t>https://www.adafruit.com/product/1770</a:t>
-                      </a:r>
-                      <a:endParaRPr lang="en-US" dirty="0"/>
-                    </a:p>
-                  </a:txBody>
-                  <a:tcPr/>
-                </a:tc>
-                <a:tc>
-                  <a:txBody>
-                    <a:bodyPr/>
-                    <a:lstStyle/>
-                    <a:p>
-                      <a:r>
-                        <a:rPr lang="en-US" dirty="0"/>
-                        <a:t>1</a:t>
-                      </a:r>
-                    </a:p>
-                    <a:p>
-                      <a:endParaRPr lang="en-US" dirty="0"/>
-                    </a:p>
-                  </a:txBody>
-                  <a:tcPr/>
-                </a:tc>
-                <a:tc>
-                  <a:txBody>
-                    <a:bodyPr/>
-                    <a:lstStyle/>
-                    <a:p>
-                      <a:r>
-                        <a:rPr lang="en-US" dirty="0"/>
-                        <a:t>30</a:t>
-                      </a:r>
-                    </a:p>
-                  </a:txBody>
-                  <a:tcPr/>
-                </a:tc>
-                <a:extLst>
-                  <a:ext uri="{0D108BD9-81ED-4DB2-BD59-A6C34878D82A}">
-                    <a16:rowId xmlns:a16="http://schemas.microsoft.com/office/drawing/2014/main" val="3862840897"/>
-                  </a:ext>
-                </a:extLst>
-              </a:tr>
-              <a:tr h="474980">
-                <a:tc>
-                  <a:txBody>
-                    <a:bodyPr/>
-                    <a:lstStyle/>
-                    <a:p>
-                      <a:r>
-                        <a:rPr lang="en-US" dirty="0"/>
-                        <a:t>Acrylic</a:t>
-                      </a:r>
-                      <a:br>
-                        <a:rPr lang="en-US" dirty="0"/>
-                      </a:br>
-                      <a:r>
-                        <a:rPr lang="en-US" dirty="0">
-                          <a:hlinkClick r:id="rId6"/>
-                        </a:rPr>
-                        <a:t>https://oedk.wildapricot.org/order</a:t>
-                      </a:r>
-                      <a:endParaRPr lang="en-US" dirty="0"/>
-                    </a:p>
-                  </a:txBody>
-                  <a:tcPr/>
-                </a:tc>
-                <a:tc>
-                  <a:txBody>
-                    <a:bodyPr/>
-                    <a:lstStyle/>
-                    <a:p>
-                      <a:r>
-                        <a:rPr lang="en-US" dirty="0"/>
-                        <a:t>2</a:t>
-                      </a:r>
-                    </a:p>
-                  </a:txBody>
-                  <a:tcPr/>
-                </a:tc>
-                <a:tc>
-                  <a:txBody>
-                    <a:bodyPr/>
-                    <a:lstStyle/>
-                    <a:p>
-                      <a:r>
-                        <a:rPr lang="en-US"/>
-                        <a:t>14</a:t>
-                      </a:r>
-                      <a:endParaRPr lang="en-US" dirty="0"/>
-                    </a:p>
-                  </a:txBody>
-                  <a:tcPr/>
-                </a:tc>
-                <a:extLst>
-                  <a:ext uri="{0D108BD9-81ED-4DB2-BD59-A6C34878D82A}">
-                    <a16:rowId xmlns:a16="http://schemas.microsoft.com/office/drawing/2014/main" val="1364489299"/>
-                  </a:ext>
-                </a:extLst>
-              </a:tr>
-            </a:tbl>
-          </a:graphicData>
-        </a:graphic>
-      </p:graphicFrame>
+          <p:cNvPicPr>
+            <a:picLocks noChangeAspect="1"/>
+          </p:cNvPicPr>
+          <p:nvPr/>
+        </p:nvPicPr>
+        <p:blipFill>
+          <a:blip r:embed="rId2"/>
+          <a:stretch>
+            <a:fillRect/>
+          </a:stretch>
+        </p:blipFill>
+        <p:spPr>
+          <a:xfrm>
+            <a:off x="2014993" y="304800"/>
+            <a:ext cx="3166607" cy="4470995"/>
+          </a:xfrm>
+          <a:prstGeom prst="rect">
+            <a:avLst/>
+          </a:prstGeom>
+        </p:spPr>
+      </p:pic>
+      <p:pic>
+        <p:nvPicPr>
+          <p:cNvPr id="9" name="Picture 8">
+            <a:extLst>
+              <a:ext uri="{FF2B5EF4-FFF2-40B4-BE49-F238E27FC236}">
+                <a16:creationId xmlns:a16="http://schemas.microsoft.com/office/drawing/2014/main" id="{40749734-CADB-A6AA-0CBD-97C2B1A26A48}"/>
+              </a:ext>
+            </a:extLst>
+          </p:cNvPr>
+          <p:cNvPicPr>
+            <a:picLocks noChangeAspect="1"/>
+          </p:cNvPicPr>
+          <p:nvPr/>
+        </p:nvPicPr>
+        <p:blipFill>
+          <a:blip r:embed="rId3"/>
+          <a:stretch>
+            <a:fillRect/>
+          </a:stretch>
+        </p:blipFill>
+        <p:spPr>
+          <a:xfrm>
+            <a:off x="2014993" y="4775795"/>
+            <a:ext cx="3173176" cy="1974851"/>
+          </a:xfrm>
+          <a:prstGeom prst="rect">
+            <a:avLst/>
+          </a:prstGeom>
+        </p:spPr>
+      </p:pic>
     </p:spTree>
     <p:extLst>
       <p:ext uri="{BB962C8B-B14F-4D97-AF65-F5344CB8AC3E}">
-        <p14:creationId xmlns:p14="http://schemas.microsoft.com/office/powerpoint/2010/main" val="1131248096"/>
+        <p14:creationId xmlns:p14="http://schemas.microsoft.com/office/powerpoint/2010/main" val="2691832611"/>
       </p:ext>
     </p:extLst>
   </p:cSld>
   <p:clrMapOvr>
     <a:masterClrMapping/>
   </p:clrMapOvr>
-  <mc:AlternateContent xmlns:mc="http://schemas.openxmlformats.org/markup-compatibility/2006" xmlns:p14="http://schemas.microsoft.com/office/powerpoint/2010/main">
-    <mc:Choice Requires="p14">
+  <mc:AlternateContent xmlns:mc="http://schemas.openxmlformats.org/markup-compatibility/2006">
+    <mc:Choice xmlns:p14="http://schemas.microsoft.com/office/powerpoint/2010/main" Requires="p14">
       <p:transition spd="med" p14:dur="700">
         <p:fade/>
       </p:transition>
     </mc:Choice>
-    <mc:Fallback xmlns="">
+    <mc:Fallback>
+      <p:transition spd="med">
+        <p:fade/>
+      </p:transition>
+    </mc:Fallback>
+  </mc:AlternateContent>
+</p:sld>
+</file>
+
+<file path=ppt/slides/slide8.xml><?xml version="1.0" encoding="utf-8"?>
+<p:sld xmlns:a="http://schemas.openxmlformats.org/drawingml/2006/main" xmlns:r="http://schemas.openxmlformats.org/officeDocument/2006/relationships" xmlns:p="http://schemas.openxmlformats.org/presentationml/2006/main">
+  <p:cSld>
+    <p:spTree>
+      <p:nvGrpSpPr>
+        <p:cNvPr id="1" name=""/>
+        <p:cNvGrpSpPr/>
+        <p:nvPr/>
+      </p:nvGrpSpPr>
+      <p:grpSpPr>
+        <a:xfrm>
+          <a:off x="0" y="0"/>
+          <a:ext cx="0" cy="0"/>
+          <a:chOff x="0" y="0"/>
+          <a:chExt cx="0" cy="0"/>
+        </a:xfrm>
+      </p:grpSpPr>
+      <p:sp>
+        <p:nvSpPr>
+          <p:cNvPr id="2" name="Title 1">
+            <a:extLst>
+              <a:ext uri="{FF2B5EF4-FFF2-40B4-BE49-F238E27FC236}">
+                <a16:creationId xmlns:a16="http://schemas.microsoft.com/office/drawing/2014/main" id="{897D86D6-35BD-40B1-6F55-3EB20816F5F6}"/>
+              </a:ext>
+            </a:extLst>
+          </p:cNvPr>
+          <p:cNvSpPr>
+            <a:spLocks noGrp="1"/>
+          </p:cNvSpPr>
+          <p:nvPr>
+            <p:ph type="title"/>
+          </p:nvPr>
+        </p:nvSpPr>
+        <p:spPr>
+          <a:xfrm>
+            <a:off x="7315200" y="-800100"/>
+            <a:ext cx="3657600" cy="2194560"/>
+          </a:xfrm>
+        </p:spPr>
+        <p:txBody>
+          <a:bodyPr anchor="b">
+            <a:normAutofit/>
+          </a:bodyPr>
+          <a:lstStyle/>
+          <a:p>
+            <a:r>
+              <a:rPr lang="en-US" dirty="0"/>
+              <a:t>Stopwatch Block Diagram</a:t>
+            </a:r>
+          </a:p>
+        </p:txBody>
+      </p:sp>
+      <p:pic>
+        <p:nvPicPr>
+          <p:cNvPr id="15" name="Picture 14">
+            <a:extLst>
+              <a:ext uri="{FF2B5EF4-FFF2-40B4-BE49-F238E27FC236}">
+                <a16:creationId xmlns:a16="http://schemas.microsoft.com/office/drawing/2014/main" id="{BF9148DC-8A77-8482-A726-E34061B5DF99}"/>
+              </a:ext>
+            </a:extLst>
+          </p:cNvPr>
+          <p:cNvPicPr>
+            <a:picLocks noChangeAspect="1"/>
+          </p:cNvPicPr>
+          <p:nvPr/>
+        </p:nvPicPr>
+        <p:blipFill>
+          <a:blip r:embed="rId2"/>
+          <a:stretch>
+            <a:fillRect/>
+          </a:stretch>
+        </p:blipFill>
+        <p:spPr>
+          <a:xfrm>
+            <a:off x="2324100" y="0"/>
+            <a:ext cx="3009900" cy="5448228"/>
+          </a:xfrm>
+          <a:prstGeom prst="rect">
+            <a:avLst/>
+          </a:prstGeom>
+        </p:spPr>
+      </p:pic>
+      <p:pic>
+        <p:nvPicPr>
+          <p:cNvPr id="17" name="Picture 16">
+            <a:extLst>
+              <a:ext uri="{FF2B5EF4-FFF2-40B4-BE49-F238E27FC236}">
+                <a16:creationId xmlns:a16="http://schemas.microsoft.com/office/drawing/2014/main" id="{CAE5F4D2-4FC1-2D0C-33B2-8D41FF48897D}"/>
+              </a:ext>
+            </a:extLst>
+          </p:cNvPr>
+          <p:cNvPicPr>
+            <a:picLocks noChangeAspect="1"/>
+          </p:cNvPicPr>
+          <p:nvPr/>
+        </p:nvPicPr>
+        <p:blipFill>
+          <a:blip r:embed="rId3"/>
+          <a:stretch>
+            <a:fillRect/>
+          </a:stretch>
+        </p:blipFill>
+        <p:spPr>
+          <a:xfrm>
+            <a:off x="2324100" y="5448228"/>
+            <a:ext cx="3009900" cy="1409772"/>
+          </a:xfrm>
+          <a:prstGeom prst="rect">
+            <a:avLst/>
+          </a:prstGeom>
+        </p:spPr>
+      </p:pic>
+    </p:spTree>
+    <p:extLst>
+      <p:ext uri="{BB962C8B-B14F-4D97-AF65-F5344CB8AC3E}">
+        <p14:creationId xmlns:p14="http://schemas.microsoft.com/office/powerpoint/2010/main" val="3978300618"/>
+      </p:ext>
+    </p:extLst>
+  </p:cSld>
+  <p:clrMapOvr>
+    <a:masterClrMapping/>
+  </p:clrMapOvr>
+  <mc:AlternateContent xmlns:mc="http://schemas.openxmlformats.org/markup-compatibility/2006">
+    <mc:Choice xmlns:p14="http://schemas.microsoft.com/office/powerpoint/2010/main" Requires="p14">
+      <p:transition spd="med" p14:dur="700">
+        <p:fade/>
+      </p:transition>
+    </mc:Choice>
+    <mc:Fallback>
+      <p:transition spd="med">
+        <p:fade/>
+      </p:transition>
+    </mc:Fallback>
+  </mc:AlternateContent>
+</p:sld>
+</file>
+
+<file path=ppt/slides/slide9.xml><?xml version="1.0" encoding="utf-8"?>
+<p:sld xmlns:a="http://schemas.openxmlformats.org/drawingml/2006/main" xmlns:r="http://schemas.openxmlformats.org/officeDocument/2006/relationships" xmlns:p="http://schemas.openxmlformats.org/presentationml/2006/main">
+  <p:cSld>
+    <p:spTree>
+      <p:nvGrpSpPr>
+        <p:cNvPr id="1" name=""/>
+        <p:cNvGrpSpPr/>
+        <p:nvPr/>
+      </p:nvGrpSpPr>
+      <p:grpSpPr>
+        <a:xfrm>
+          <a:off x="0" y="0"/>
+          <a:ext cx="0" cy="0"/>
+          <a:chOff x="0" y="0"/>
+          <a:chExt cx="0" cy="0"/>
+        </a:xfrm>
+      </p:grpSpPr>
+      <p:sp>
+        <p:nvSpPr>
+          <p:cNvPr id="2" name="Title 1">
+            <a:extLst>
+              <a:ext uri="{FF2B5EF4-FFF2-40B4-BE49-F238E27FC236}">
+                <a16:creationId xmlns:a16="http://schemas.microsoft.com/office/drawing/2014/main" id="{897D86D6-35BD-40B1-6F55-3EB20816F5F6}"/>
+              </a:ext>
+            </a:extLst>
+          </p:cNvPr>
+          <p:cNvSpPr>
+            <a:spLocks noGrp="1"/>
+          </p:cNvSpPr>
+          <p:nvPr>
+            <p:ph type="title"/>
+          </p:nvPr>
+        </p:nvSpPr>
+        <p:spPr>
+          <a:xfrm>
+            <a:off x="7315200" y="-800100"/>
+            <a:ext cx="3657600" cy="2194560"/>
+          </a:xfrm>
+        </p:spPr>
+        <p:txBody>
+          <a:bodyPr anchor="b">
+            <a:normAutofit/>
+          </a:bodyPr>
+          <a:lstStyle/>
+          <a:p>
+            <a:r>
+              <a:rPr lang="en-US" dirty="0"/>
+              <a:t>Python Classes and Functions</a:t>
+            </a:r>
+          </a:p>
+        </p:txBody>
+      </p:sp>
+      <p:pic>
+        <p:nvPicPr>
+          <p:cNvPr id="6" name="Picture 5">
+            <a:extLst>
+              <a:ext uri="{FF2B5EF4-FFF2-40B4-BE49-F238E27FC236}">
+                <a16:creationId xmlns:a16="http://schemas.microsoft.com/office/drawing/2014/main" id="{9AAF112C-7825-A772-CC74-0CED1F0B1F01}"/>
+              </a:ext>
+            </a:extLst>
+          </p:cNvPr>
+          <p:cNvPicPr>
+            <a:picLocks noChangeAspect="1"/>
+          </p:cNvPicPr>
+          <p:nvPr/>
+        </p:nvPicPr>
+        <p:blipFill>
+          <a:blip r:embed="rId2"/>
+          <a:stretch>
+            <a:fillRect/>
+          </a:stretch>
+        </p:blipFill>
+        <p:spPr>
+          <a:xfrm>
+            <a:off x="65688" y="2667000"/>
+            <a:ext cx="6182711" cy="3657600"/>
+          </a:xfrm>
+          <a:prstGeom prst="rect">
+            <a:avLst/>
+          </a:prstGeom>
+        </p:spPr>
+      </p:pic>
+      <p:pic>
+        <p:nvPicPr>
+          <p:cNvPr id="8" name="Picture 7">
+            <a:extLst>
+              <a:ext uri="{FF2B5EF4-FFF2-40B4-BE49-F238E27FC236}">
+                <a16:creationId xmlns:a16="http://schemas.microsoft.com/office/drawing/2014/main" id="{30ABB0E4-EBF0-2B82-D029-C25453BF74DA}"/>
+              </a:ext>
+            </a:extLst>
+          </p:cNvPr>
+          <p:cNvPicPr>
+            <a:picLocks noChangeAspect="1"/>
+          </p:cNvPicPr>
+          <p:nvPr/>
+        </p:nvPicPr>
+        <p:blipFill>
+          <a:blip r:embed="rId3"/>
+          <a:stretch>
+            <a:fillRect/>
+          </a:stretch>
+        </p:blipFill>
+        <p:spPr>
+          <a:xfrm>
+            <a:off x="65030" y="152400"/>
+            <a:ext cx="6182710" cy="723900"/>
+          </a:xfrm>
+          <a:prstGeom prst="rect">
+            <a:avLst/>
+          </a:prstGeom>
+        </p:spPr>
+      </p:pic>
+      <p:pic>
+        <p:nvPicPr>
+          <p:cNvPr id="10" name="Picture 9">
+            <a:extLst>
+              <a:ext uri="{FF2B5EF4-FFF2-40B4-BE49-F238E27FC236}">
+                <a16:creationId xmlns:a16="http://schemas.microsoft.com/office/drawing/2014/main" id="{4E0FE0F6-2E3B-FA72-246F-686B802C17DE}"/>
+              </a:ext>
+            </a:extLst>
+          </p:cNvPr>
+          <p:cNvPicPr>
+            <a:picLocks noChangeAspect="1"/>
+          </p:cNvPicPr>
+          <p:nvPr/>
+        </p:nvPicPr>
+        <p:blipFill>
+          <a:blip r:embed="rId4"/>
+          <a:stretch>
+            <a:fillRect/>
+          </a:stretch>
+        </p:blipFill>
+        <p:spPr>
+          <a:xfrm>
+            <a:off x="65030" y="1028700"/>
+            <a:ext cx="6182711" cy="1333500"/>
+          </a:xfrm>
+          <a:prstGeom prst="rect">
+            <a:avLst/>
+          </a:prstGeom>
+        </p:spPr>
+      </p:pic>
+      <p:pic>
+        <p:nvPicPr>
+          <p:cNvPr id="12" name="Picture 11">
+            <a:extLst>
+              <a:ext uri="{FF2B5EF4-FFF2-40B4-BE49-F238E27FC236}">
+                <a16:creationId xmlns:a16="http://schemas.microsoft.com/office/drawing/2014/main" id="{DD618259-A053-C760-75A9-D1E75A437833}"/>
+              </a:ext>
+            </a:extLst>
+          </p:cNvPr>
+          <p:cNvPicPr>
+            <a:picLocks noChangeAspect="1"/>
+          </p:cNvPicPr>
+          <p:nvPr/>
+        </p:nvPicPr>
+        <p:blipFill>
+          <a:blip r:embed="rId5"/>
+          <a:stretch>
+            <a:fillRect/>
+          </a:stretch>
+        </p:blipFill>
+        <p:spPr>
+          <a:xfrm>
+            <a:off x="6415972" y="2552700"/>
+            <a:ext cx="5456056" cy="1051166"/>
+          </a:xfrm>
+          <a:prstGeom prst="rect">
+            <a:avLst/>
+          </a:prstGeom>
+        </p:spPr>
+      </p:pic>
+    </p:spTree>
+    <p:extLst>
+      <p:ext uri="{BB962C8B-B14F-4D97-AF65-F5344CB8AC3E}">
+        <p14:creationId xmlns:p14="http://schemas.microsoft.com/office/powerpoint/2010/main" val="4074457878"/>
+      </p:ext>
+    </p:extLst>
+  </p:cSld>
+  <p:clrMapOvr>
+    <a:masterClrMapping/>
+  </p:clrMapOvr>
+  <mc:AlternateContent xmlns:mc="http://schemas.openxmlformats.org/markup-compatibility/2006">
+    <mc:Choice xmlns:p14="http://schemas.microsoft.com/office/powerpoint/2010/main" Requires="p14">
+      <p:transition spd="med" p14:dur="700">
+        <p:fade/>
+      </p:transition>
+    </mc:Choice>
+    <mc:Fallback>
       <p:transition spd="med">
         <p:fade/>
       </p:transition>

</xml_diff>